<commit_message>
All stages of assignment 2 are now complete
</commit_message>
<xml_diff>
--- a/field2Proj/projectppt.pptx
+++ b/field2Proj/projectppt.pptx
@@ -109,6 +109,11 @@
       </a:defRPr>
     </a:lvl9pPr>
   </p:defaultTextStyle>
+  <p:extLst>
+    <p:ext uri="{EFAFB233-063F-42B5-8137-9DF3F51BA10A}">
+      <p15:sldGuideLst xmlns:p15="http://schemas.microsoft.com/office/powerpoint/2012/main"/>
+    </p:ext>
+  </p:extLst>
 </p:presentation>
 </file>
 
@@ -194,7 +199,7 @@
           <a:p>
             <a:fld id="{8C9FDC27-D43C-4DB9-A6D2-65240D57C3B4}" type="datetimeFigureOut">
               <a:rPr lang="en-US" smtClean="0"/>
-              <a:t>9/23/2019</a:t>
+              <a:t>9/25/2019</a:t>
             </a:fld>
             <a:endParaRPr lang="en-US"/>
           </a:p>
@@ -776,7 +781,7 @@
           <a:p>
             <a:fld id="{7E547490-8B43-47FD-8534-65005EC9D482}" type="datetimeFigureOut">
               <a:rPr lang="en-US" smtClean="0"/>
-              <a:t>9/23/2019</a:t>
+              <a:t>9/25/2019</a:t>
             </a:fld>
             <a:endParaRPr lang="en-US"/>
           </a:p>
@@ -974,7 +979,7 @@
           <a:p>
             <a:fld id="{7E547490-8B43-47FD-8534-65005EC9D482}" type="datetimeFigureOut">
               <a:rPr lang="en-US" smtClean="0"/>
-              <a:t>9/23/2019</a:t>
+              <a:t>9/25/2019</a:t>
             </a:fld>
             <a:endParaRPr lang="en-US"/>
           </a:p>
@@ -1182,7 +1187,7 @@
           <a:p>
             <a:fld id="{7E547490-8B43-47FD-8534-65005EC9D482}" type="datetimeFigureOut">
               <a:rPr lang="en-US" smtClean="0"/>
-              <a:t>9/23/2019</a:t>
+              <a:t>9/25/2019</a:t>
             </a:fld>
             <a:endParaRPr lang="en-US"/>
           </a:p>
@@ -1380,7 +1385,7 @@
           <a:p>
             <a:fld id="{7E547490-8B43-47FD-8534-65005EC9D482}" type="datetimeFigureOut">
               <a:rPr lang="en-US" smtClean="0"/>
-              <a:t>9/23/2019</a:t>
+              <a:t>9/25/2019</a:t>
             </a:fld>
             <a:endParaRPr lang="en-US"/>
           </a:p>
@@ -1655,7 +1660,7 @@
           <a:p>
             <a:fld id="{7E547490-8B43-47FD-8534-65005EC9D482}" type="datetimeFigureOut">
               <a:rPr lang="en-US" smtClean="0"/>
-              <a:t>9/23/2019</a:t>
+              <a:t>9/25/2019</a:t>
             </a:fld>
             <a:endParaRPr lang="en-US"/>
           </a:p>
@@ -1920,7 +1925,7 @@
           <a:p>
             <a:fld id="{7E547490-8B43-47FD-8534-65005EC9D482}" type="datetimeFigureOut">
               <a:rPr lang="en-US" smtClean="0"/>
-              <a:t>9/23/2019</a:t>
+              <a:t>9/25/2019</a:t>
             </a:fld>
             <a:endParaRPr lang="en-US"/>
           </a:p>
@@ -2332,7 +2337,7 @@
           <a:p>
             <a:fld id="{7E547490-8B43-47FD-8534-65005EC9D482}" type="datetimeFigureOut">
               <a:rPr lang="en-US" smtClean="0"/>
-              <a:t>9/23/2019</a:t>
+              <a:t>9/25/2019</a:t>
             </a:fld>
             <a:endParaRPr lang="en-US"/>
           </a:p>
@@ -2473,7 +2478,7 @@
           <a:p>
             <a:fld id="{7E547490-8B43-47FD-8534-65005EC9D482}" type="datetimeFigureOut">
               <a:rPr lang="en-US" smtClean="0"/>
-              <a:t>9/23/2019</a:t>
+              <a:t>9/25/2019</a:t>
             </a:fld>
             <a:endParaRPr lang="en-US"/>
           </a:p>
@@ -2586,7 +2591,7 @@
           <a:p>
             <a:fld id="{7E547490-8B43-47FD-8534-65005EC9D482}" type="datetimeFigureOut">
               <a:rPr lang="en-US" smtClean="0"/>
-              <a:t>9/23/2019</a:t>
+              <a:t>9/25/2019</a:t>
             </a:fld>
             <a:endParaRPr lang="en-US"/>
           </a:p>
@@ -2897,7 +2902,7 @@
           <a:p>
             <a:fld id="{7E547490-8B43-47FD-8534-65005EC9D482}" type="datetimeFigureOut">
               <a:rPr lang="en-US" smtClean="0"/>
-              <a:t>9/23/2019</a:t>
+              <a:t>9/25/2019</a:t>
             </a:fld>
             <a:endParaRPr lang="en-US"/>
           </a:p>
@@ -3185,7 +3190,7 @@
           <a:p>
             <a:fld id="{7E547490-8B43-47FD-8534-65005EC9D482}" type="datetimeFigureOut">
               <a:rPr lang="en-US" smtClean="0"/>
-              <a:t>9/23/2019</a:t>
+              <a:t>9/25/2019</a:t>
             </a:fld>
             <a:endParaRPr lang="en-US"/>
           </a:p>
@@ -3426,7 +3431,7 @@
           <a:p>
             <a:fld id="{7E547490-8B43-47FD-8534-65005EC9D482}" type="datetimeFigureOut">
               <a:rPr lang="en-US" smtClean="0"/>
-              <a:t>9/23/2019</a:t>
+              <a:t>9/25/2019</a:t>
             </a:fld>
             <a:endParaRPr lang="en-US"/>
           </a:p>
@@ -3865,8 +3870,8 @@
         </p:nvSpPr>
         <p:spPr>
           <a:xfrm>
-            <a:off x="2321562" y="185411"/>
-            <a:ext cx="7419532" cy="523220"/>
+            <a:off x="2794038" y="391295"/>
+            <a:ext cx="6264985" cy="461665"/>
           </a:xfrm>
           <a:prstGeom prst="rect">
             <a:avLst/>
@@ -3880,7 +3885,7 @@
           <a:lstStyle/>
           <a:p>
             <a:r>
-              <a:rPr lang="en-US" sz="2800" dirty="0" err="1">
+              <a:rPr lang="en-US" sz="2400" dirty="0" err="1">
                 <a:solidFill>
                   <a:schemeClr val="bg1"/>
                 </a:solidFill>
@@ -3888,7 +3893,7 @@
               <a:t>Psf</a:t>
             </a:r>
             <a:r>
-              <a:rPr lang="en-US" sz="2800" dirty="0">
+              <a:rPr lang="en-US" sz="2400" dirty="0">
                 <a:solidFill>
                   <a:schemeClr val="bg1"/>
                 </a:solidFill>
@@ -4401,9 +4406,9 @@
           <p:nvPr/>
         </p:nvSpPr>
         <p:spPr>
-          <a:xfrm>
-            <a:off x="2082076" y="3371873"/>
-            <a:ext cx="665564" cy="523220"/>
+          <a:xfrm rot="16200000">
+            <a:off x="1727564" y="2389637"/>
+            <a:ext cx="1925924" cy="353943"/>
           </a:xfrm>
           <a:prstGeom prst="rect">
             <a:avLst/>
@@ -4417,7 +4422,7 @@
           <a:lstStyle/>
           <a:p>
             <a:r>
-              <a:rPr lang="en-US" sz="1400" dirty="0">
+              <a:rPr lang="en-US" sz="1700" dirty="0">
                 <a:solidFill>
                   <a:schemeClr val="bg1"/>
                 </a:solidFill>
@@ -4443,8 +4448,8 @@
         </p:nvSpPr>
         <p:spPr>
           <a:xfrm>
-            <a:off x="2302937" y="4291391"/>
-            <a:ext cx="6889448" cy="223355"/>
+            <a:off x="3788229" y="4291391"/>
+            <a:ext cx="5404156" cy="228193"/>
           </a:xfrm>
           <a:prstGeom prst="rect">
             <a:avLst/>
@@ -4494,9 +4499,9 @@
           <p:nvPr/>
         </p:nvSpPr>
         <p:spPr>
-          <a:xfrm>
-            <a:off x="554362" y="4254017"/>
-            <a:ext cx="1801793" cy="307777"/>
+          <a:xfrm rot="16200000">
+            <a:off x="1563247" y="5353375"/>
+            <a:ext cx="2254557" cy="353943"/>
           </a:xfrm>
           <a:prstGeom prst="rect">
             <a:avLst/>
@@ -4510,7 +4515,7 @@
           <a:lstStyle/>
           <a:p>
             <a:r>
-              <a:rPr lang="en-US" sz="1400" dirty="0">
+              <a:rPr lang="en-US" sz="1700" dirty="0">
                 <a:solidFill>
                   <a:schemeClr val="bg1"/>
                 </a:solidFill>
@@ -4522,6 +4527,45 @@
           </a:p>
         </p:txBody>
       </p:sp>
+      <p:cxnSp>
+        <p:nvCxnSpPr>
+          <p:cNvPr id="3" name="Straight Arrow Connector 2">
+            <a:extLst>
+              <a:ext uri="{FF2B5EF4-FFF2-40B4-BE49-F238E27FC236}">
+                <a16:creationId xmlns:a16="http://schemas.microsoft.com/office/drawing/2014/main" id="{08822D3E-93B7-4DC1-B17B-249CB4F71AAF}"/>
+              </a:ext>
+            </a:extLst>
+          </p:cNvPr>
+          <p:cNvCxnSpPr/>
+          <p:nvPr/>
+        </p:nvCxnSpPr>
+        <p:spPr>
+          <a:xfrm flipV="1">
+            <a:off x="2994781" y="4610705"/>
+            <a:ext cx="682171" cy="575733"/>
+          </a:xfrm>
+          <a:prstGeom prst="straightConnector1">
+            <a:avLst/>
+          </a:prstGeom>
+          <a:ln w="28575">
+            <a:tailEnd type="triangle"/>
+          </a:ln>
+        </p:spPr>
+        <p:style>
+          <a:lnRef idx="1">
+            <a:schemeClr val="accent1"/>
+          </a:lnRef>
+          <a:fillRef idx="0">
+            <a:schemeClr val="accent1"/>
+          </a:fillRef>
+          <a:effectRef idx="0">
+            <a:schemeClr val="accent1"/>
+          </a:effectRef>
+          <a:fontRef idx="minor">
+            <a:schemeClr val="tx1"/>
+          </a:fontRef>
+        </p:style>
+      </p:cxnSp>
     </p:spTree>
     <p:extLst>
       <p:ext uri="{BB962C8B-B14F-4D97-AF65-F5344CB8AC3E}">
@@ -4560,53 +4604,6 @@
           <a:chExt cx="0" cy="0"/>
         </a:xfrm>
       </p:grpSpPr>
-      <p:sp>
-        <p:nvSpPr>
-          <p:cNvPr id="5" name="TextBox 4">
-            <a:extLst>
-              <a:ext uri="{FF2B5EF4-FFF2-40B4-BE49-F238E27FC236}">
-                <a16:creationId xmlns:a16="http://schemas.microsoft.com/office/drawing/2014/main" id="{6264B372-7825-4B6C-AA5C-70EAD24A6D92}"/>
-              </a:ext>
-            </a:extLst>
-          </p:cNvPr>
-          <p:cNvSpPr txBox="1"/>
-          <p:nvPr/>
-        </p:nvSpPr>
-        <p:spPr>
-          <a:xfrm>
-            <a:off x="2321562" y="340227"/>
-            <a:ext cx="7419532" cy="523220"/>
-          </a:xfrm>
-          <a:prstGeom prst="rect">
-            <a:avLst/>
-          </a:prstGeom>
-          <a:noFill/>
-        </p:spPr>
-        <p:txBody>
-          <a:bodyPr wrap="none" rtlCol="0">
-            <a:spAutoFit/>
-          </a:bodyPr>
-          <a:lstStyle/>
-          <a:p>
-            <a:r>
-              <a:rPr lang="en-US" sz="2800" dirty="0" err="1">
-                <a:solidFill>
-                  <a:schemeClr val="bg1"/>
-                </a:solidFill>
-              </a:rPr>
-              <a:t>Psf</a:t>
-            </a:r>
-            <a:r>
-              <a:rPr lang="en-US" sz="2800" dirty="0">
-                <a:solidFill>
-                  <a:schemeClr val="bg1"/>
-                </a:solidFill>
-              </a:rPr>
-              <a:t> with increasing minimum quantization values</a:t>
-            </a:r>
-          </a:p>
-        </p:txBody>
-      </p:sp>
       <p:sp>
         <p:nvSpPr>
           <p:cNvPr id="7" name="TextBox 6">

</xml_diff>

<commit_message>
added intro, wrote fieldii from scratch
</commit_message>
<xml_diff>
--- a/field2Proj/projectppt.pptx
+++ b/field2Proj/projectppt.pptx
@@ -199,7 +199,7 @@
           <a:p>
             <a:fld id="{8C9FDC27-D43C-4DB9-A6D2-65240D57C3B4}" type="datetimeFigureOut">
               <a:rPr lang="en-US" smtClean="0"/>
-              <a:t>9/25/2019</a:t>
+              <a:t>10/1/2019</a:t>
             </a:fld>
             <a:endParaRPr lang="en-US"/>
           </a:p>
@@ -781,7 +781,7 @@
           <a:p>
             <a:fld id="{7E547490-8B43-47FD-8534-65005EC9D482}" type="datetimeFigureOut">
               <a:rPr lang="en-US" smtClean="0"/>
-              <a:t>9/25/2019</a:t>
+              <a:t>10/1/2019</a:t>
             </a:fld>
             <a:endParaRPr lang="en-US"/>
           </a:p>
@@ -979,7 +979,7 @@
           <a:p>
             <a:fld id="{7E547490-8B43-47FD-8534-65005EC9D482}" type="datetimeFigureOut">
               <a:rPr lang="en-US" smtClean="0"/>
-              <a:t>9/25/2019</a:t>
+              <a:t>10/1/2019</a:t>
             </a:fld>
             <a:endParaRPr lang="en-US"/>
           </a:p>
@@ -1187,7 +1187,7 @@
           <a:p>
             <a:fld id="{7E547490-8B43-47FD-8534-65005EC9D482}" type="datetimeFigureOut">
               <a:rPr lang="en-US" smtClean="0"/>
-              <a:t>9/25/2019</a:t>
+              <a:t>10/1/2019</a:t>
             </a:fld>
             <a:endParaRPr lang="en-US"/>
           </a:p>
@@ -1385,7 +1385,7 @@
           <a:p>
             <a:fld id="{7E547490-8B43-47FD-8534-65005EC9D482}" type="datetimeFigureOut">
               <a:rPr lang="en-US" smtClean="0"/>
-              <a:t>9/25/2019</a:t>
+              <a:t>10/1/2019</a:t>
             </a:fld>
             <a:endParaRPr lang="en-US"/>
           </a:p>
@@ -1660,7 +1660,7 @@
           <a:p>
             <a:fld id="{7E547490-8B43-47FD-8534-65005EC9D482}" type="datetimeFigureOut">
               <a:rPr lang="en-US" smtClean="0"/>
-              <a:t>9/25/2019</a:t>
+              <a:t>10/1/2019</a:t>
             </a:fld>
             <a:endParaRPr lang="en-US"/>
           </a:p>
@@ -1925,7 +1925,7 @@
           <a:p>
             <a:fld id="{7E547490-8B43-47FD-8534-65005EC9D482}" type="datetimeFigureOut">
               <a:rPr lang="en-US" smtClean="0"/>
-              <a:t>9/25/2019</a:t>
+              <a:t>10/1/2019</a:t>
             </a:fld>
             <a:endParaRPr lang="en-US"/>
           </a:p>
@@ -2337,7 +2337,7 @@
           <a:p>
             <a:fld id="{7E547490-8B43-47FD-8534-65005EC9D482}" type="datetimeFigureOut">
               <a:rPr lang="en-US" smtClean="0"/>
-              <a:t>9/25/2019</a:t>
+              <a:t>10/1/2019</a:t>
             </a:fld>
             <a:endParaRPr lang="en-US"/>
           </a:p>
@@ -2478,7 +2478,7 @@
           <a:p>
             <a:fld id="{7E547490-8B43-47FD-8534-65005EC9D482}" type="datetimeFigureOut">
               <a:rPr lang="en-US" smtClean="0"/>
-              <a:t>9/25/2019</a:t>
+              <a:t>10/1/2019</a:t>
             </a:fld>
             <a:endParaRPr lang="en-US"/>
           </a:p>
@@ -2591,7 +2591,7 @@
           <a:p>
             <a:fld id="{7E547490-8B43-47FD-8534-65005EC9D482}" type="datetimeFigureOut">
               <a:rPr lang="en-US" smtClean="0"/>
-              <a:t>9/25/2019</a:t>
+              <a:t>10/1/2019</a:t>
             </a:fld>
             <a:endParaRPr lang="en-US"/>
           </a:p>
@@ -2902,7 +2902,7 @@
           <a:p>
             <a:fld id="{7E547490-8B43-47FD-8534-65005EC9D482}" type="datetimeFigureOut">
               <a:rPr lang="en-US" smtClean="0"/>
-              <a:t>9/25/2019</a:t>
+              <a:t>10/1/2019</a:t>
             </a:fld>
             <a:endParaRPr lang="en-US"/>
           </a:p>
@@ -3190,7 +3190,7 @@
           <a:p>
             <a:fld id="{7E547490-8B43-47FD-8534-65005EC9D482}" type="datetimeFigureOut">
               <a:rPr lang="en-US" smtClean="0"/>
-              <a:t>9/25/2019</a:t>
+              <a:t>10/1/2019</a:t>
             </a:fld>
             <a:endParaRPr lang="en-US"/>
           </a:p>
@@ -3431,7 +3431,7 @@
           <a:p>
             <a:fld id="{7E547490-8B43-47FD-8534-65005EC9D482}" type="datetimeFigureOut">
               <a:rPr lang="en-US" smtClean="0"/>
-              <a:t>9/25/2019</a:t>
+              <a:t>10/1/2019</a:t>
             </a:fld>
             <a:endParaRPr lang="en-US"/>
           </a:p>
@@ -3856,59 +3856,12 @@
           <a:chExt cx="0" cy="0"/>
         </a:xfrm>
       </p:grpSpPr>
-      <p:sp>
-        <p:nvSpPr>
-          <p:cNvPr id="5" name="TextBox 4">
-            <a:extLst>
-              <a:ext uri="{FF2B5EF4-FFF2-40B4-BE49-F238E27FC236}">
-                <a16:creationId xmlns:a16="http://schemas.microsoft.com/office/drawing/2014/main" id="{6264B372-7825-4B6C-AA5C-70EAD24A6D92}"/>
-              </a:ext>
-            </a:extLst>
-          </p:cNvPr>
-          <p:cNvSpPr txBox="1"/>
-          <p:nvPr/>
-        </p:nvSpPr>
-        <p:spPr>
-          <a:xfrm>
-            <a:off x="2794038" y="391295"/>
-            <a:ext cx="6264985" cy="461665"/>
-          </a:xfrm>
-          <a:prstGeom prst="rect">
-            <a:avLst/>
-          </a:prstGeom>
-          <a:noFill/>
-        </p:spPr>
-        <p:txBody>
-          <a:bodyPr wrap="none" rtlCol="0">
-            <a:spAutoFit/>
-          </a:bodyPr>
-          <a:lstStyle/>
-          <a:p>
-            <a:r>
-              <a:rPr lang="en-US" sz="2400" dirty="0" err="1">
-                <a:solidFill>
-                  <a:schemeClr val="bg1"/>
-                </a:solidFill>
-              </a:rPr>
-              <a:t>Psf</a:t>
-            </a:r>
-            <a:r>
-              <a:rPr lang="en-US" sz="2400" dirty="0">
-                <a:solidFill>
-                  <a:schemeClr val="bg1"/>
-                </a:solidFill>
-              </a:rPr>
-              <a:t> with increasing minimum quantization values</a:t>
-            </a:r>
-          </a:p>
-        </p:txBody>
-      </p:sp>
       <p:pic>
         <p:nvPicPr>
-          <p:cNvPr id="6" name="Picture 5">
-            <a:extLst>
-              <a:ext uri="{FF2B5EF4-FFF2-40B4-BE49-F238E27FC236}">
-                <a16:creationId xmlns:a16="http://schemas.microsoft.com/office/drawing/2014/main" id="{FFF59657-8A74-4CE3-AC26-C57B14C9198C}"/>
+          <p:cNvPr id="2" name="Picture 1">
+            <a:extLst>
+              <a:ext uri="{FF2B5EF4-FFF2-40B4-BE49-F238E27FC236}">
+                <a16:creationId xmlns:a16="http://schemas.microsoft.com/office/drawing/2014/main" id="{7A76B29B-D509-40B9-A8F7-89BCC47719BD}"/>
               </a:ext>
             </a:extLst>
           </p:cNvPr>
@@ -3925,8 +3878,8 @@
         </p:blipFill>
         <p:spPr>
           <a:xfrm>
-            <a:off x="3536942" y="1194484"/>
-            <a:ext cx="5720715" cy="5626418"/>
+            <a:off x="3591872" y="1134880"/>
+            <a:ext cx="5583204" cy="5409117"/>
           </a:xfrm>
           <a:prstGeom prst="rect">
             <a:avLst/>
@@ -3935,10 +3888,10 @@
       </p:pic>
       <p:sp>
         <p:nvSpPr>
-          <p:cNvPr id="7" name="TextBox 6">
-            <a:extLst>
-              <a:ext uri="{FF2B5EF4-FFF2-40B4-BE49-F238E27FC236}">
-                <a16:creationId xmlns:a16="http://schemas.microsoft.com/office/drawing/2014/main" id="{3D7AB8D4-E017-4558-AB4D-DDCD39EC31F7}"/>
+          <p:cNvPr id="5" name="TextBox 4">
+            <a:extLst>
+              <a:ext uri="{FF2B5EF4-FFF2-40B4-BE49-F238E27FC236}">
+                <a16:creationId xmlns:a16="http://schemas.microsoft.com/office/drawing/2014/main" id="{6264B372-7825-4B6C-AA5C-70EAD24A6D92}"/>
               </a:ext>
             </a:extLst>
           </p:cNvPr>
@@ -3947,8 +3900,47 @@
         </p:nvSpPr>
         <p:spPr>
           <a:xfrm>
-            <a:off x="3933476" y="870582"/>
-            <a:ext cx="623889" cy="400110"/>
+            <a:off x="2794038" y="391295"/>
+            <a:ext cx="6340005" cy="461665"/>
+          </a:xfrm>
+          <a:prstGeom prst="rect">
+            <a:avLst/>
+          </a:prstGeom>
+          <a:noFill/>
+        </p:spPr>
+        <p:txBody>
+          <a:bodyPr wrap="none" rtlCol="0">
+            <a:spAutoFit/>
+          </a:bodyPr>
+          <a:lstStyle/>
+          <a:p>
+            <a:r>
+              <a:rPr lang="en-US" sz="2400" dirty="0">
+                <a:solidFill>
+                  <a:schemeClr val="bg1"/>
+                </a:solidFill>
+              </a:rPr>
+              <a:t>PSF with increasing minimum quantization values</a:t>
+            </a:r>
+          </a:p>
+        </p:txBody>
+      </p:sp>
+      <p:sp>
+        <p:nvSpPr>
+          <p:cNvPr id="7" name="TextBox 6">
+            <a:extLst>
+              <a:ext uri="{FF2B5EF4-FFF2-40B4-BE49-F238E27FC236}">
+                <a16:creationId xmlns:a16="http://schemas.microsoft.com/office/drawing/2014/main" id="{3D7AB8D4-E017-4558-AB4D-DDCD39EC31F7}"/>
+              </a:ext>
+            </a:extLst>
+          </p:cNvPr>
+          <p:cNvSpPr txBox="1"/>
+          <p:nvPr/>
+        </p:nvSpPr>
+        <p:spPr>
+          <a:xfrm>
+            <a:off x="3846697" y="839194"/>
+            <a:ext cx="683200" cy="400110"/>
           </a:xfrm>
           <a:prstGeom prst="rect">
             <a:avLst/>
@@ -3969,7 +3961,7 @@
                 <a:latin typeface="Times New Roman" panose="02020603050405020304" pitchFamily="18" charset="0"/>
                 <a:cs typeface="Times New Roman" panose="02020603050405020304" pitchFamily="18" charset="0"/>
               </a:rPr>
-              <a:t>0 µs</a:t>
+              <a:t>none</a:t>
             </a:r>
           </a:p>
         </p:txBody>
@@ -3988,8 +3980,8 @@
         </p:nvSpPr>
         <p:spPr>
           <a:xfrm>
-            <a:off x="5290356" y="870582"/>
-            <a:ext cx="816249" cy="400110"/>
+            <a:off x="5335294" y="839194"/>
+            <a:ext cx="636713" cy="400110"/>
           </a:xfrm>
           <a:prstGeom prst="rect">
             <a:avLst/>
@@ -4002,6 +3994,16 @@
           </a:bodyPr>
           <a:lstStyle/>
           <a:p>
+            <a:r>
+              <a:rPr lang="el-GR" sz="2000" dirty="0">
+                <a:solidFill>
+                  <a:schemeClr val="bg1"/>
+                </a:solidFill>
+                <a:latin typeface="Times New Roman" panose="02020603050405020304" pitchFamily="18" charset="0"/>
+                <a:cs typeface="Times New Roman" panose="02020603050405020304" pitchFamily="18" charset="0"/>
+              </a:rPr>
+              <a:t>λ</a:t>
+            </a:r>
             <a:r>
               <a:rPr lang="en-US" sz="2000" dirty="0">
                 <a:solidFill>
@@ -4010,89 +4012,7 @@
                 <a:latin typeface="Times New Roman" panose="02020603050405020304" pitchFamily="18" charset="0"/>
                 <a:cs typeface="Times New Roman" panose="02020603050405020304" pitchFamily="18" charset="0"/>
               </a:rPr>
-              <a:t>.01 µs</a:t>
-            </a:r>
-          </a:p>
-        </p:txBody>
-      </p:sp>
-      <p:sp>
-        <p:nvSpPr>
-          <p:cNvPr id="9" name="TextBox 8">
-            <a:extLst>
-              <a:ext uri="{FF2B5EF4-FFF2-40B4-BE49-F238E27FC236}">
-                <a16:creationId xmlns:a16="http://schemas.microsoft.com/office/drawing/2014/main" id="{5E8AD933-0AAC-47A3-872A-4B4214749DAE}"/>
-              </a:ext>
-            </a:extLst>
-          </p:cNvPr>
-          <p:cNvSpPr txBox="1"/>
-          <p:nvPr/>
-        </p:nvSpPr>
-        <p:spPr>
-          <a:xfrm>
-            <a:off x="6796282" y="870582"/>
-            <a:ext cx="688009" cy="400110"/>
-          </a:xfrm>
-          <a:prstGeom prst="rect">
-            <a:avLst/>
-          </a:prstGeom>
-          <a:noFill/>
-        </p:spPr>
-        <p:txBody>
-          <a:bodyPr wrap="none" rtlCol="0">
-            <a:spAutoFit/>
-          </a:bodyPr>
-          <a:lstStyle/>
-          <a:p>
-            <a:r>
-              <a:rPr lang="en-US" sz="2000" dirty="0">
-                <a:solidFill>
-                  <a:schemeClr val="bg1"/>
-                </a:solidFill>
-                <a:latin typeface="Times New Roman" panose="02020603050405020304" pitchFamily="18" charset="0"/>
-                <a:cs typeface="Times New Roman" panose="02020603050405020304" pitchFamily="18" charset="0"/>
-              </a:rPr>
-              <a:t>.1 µs</a:t>
-            </a:r>
-          </a:p>
-        </p:txBody>
-      </p:sp>
-      <p:sp>
-        <p:nvSpPr>
-          <p:cNvPr id="10" name="TextBox 9">
-            <a:extLst>
-              <a:ext uri="{FF2B5EF4-FFF2-40B4-BE49-F238E27FC236}">
-                <a16:creationId xmlns:a16="http://schemas.microsoft.com/office/drawing/2014/main" id="{6DE07F4C-D37D-4434-A598-318869F51960}"/>
-              </a:ext>
-            </a:extLst>
-          </p:cNvPr>
-          <p:cNvSpPr txBox="1"/>
-          <p:nvPr/>
-        </p:nvSpPr>
-        <p:spPr>
-          <a:xfrm>
-            <a:off x="8202546" y="870582"/>
-            <a:ext cx="559769" cy="400110"/>
-          </a:xfrm>
-          <a:prstGeom prst="rect">
-            <a:avLst/>
-          </a:prstGeom>
-          <a:noFill/>
-        </p:spPr>
-        <p:txBody>
-          <a:bodyPr wrap="none" rtlCol="0">
-            <a:spAutoFit/>
-          </a:bodyPr>
-          <a:lstStyle/>
-          <a:p>
-            <a:r>
-              <a:rPr lang="en-US" sz="2000" dirty="0">
-                <a:solidFill>
-                  <a:schemeClr val="bg1"/>
-                </a:solidFill>
-                <a:latin typeface="Times New Roman" panose="02020603050405020304" pitchFamily="18" charset="0"/>
-                <a:cs typeface="Times New Roman" panose="02020603050405020304" pitchFamily="18" charset="0"/>
-              </a:rPr>
-              <a:t>1µs</a:t>
+              <a:t>/10</a:t>
             </a:r>
           </a:p>
         </p:txBody>
@@ -4448,7 +4368,7 @@
         </p:nvSpPr>
         <p:spPr>
           <a:xfrm>
-            <a:off x="3788229" y="4291391"/>
+            <a:off x="3788229" y="4164779"/>
             <a:ext cx="5404156" cy="228193"/>
           </a:xfrm>
           <a:prstGeom prst="rect">
@@ -4566,6 +4486,105 @@
           </a:fontRef>
         </p:style>
       </p:cxnSp>
+      <p:sp>
+        <p:nvSpPr>
+          <p:cNvPr id="21" name="TextBox 20">
+            <a:extLst>
+              <a:ext uri="{FF2B5EF4-FFF2-40B4-BE49-F238E27FC236}">
+                <a16:creationId xmlns:a16="http://schemas.microsoft.com/office/drawing/2014/main" id="{CB537C58-71DC-4F2B-94C9-B64B78F42687}"/>
+              </a:ext>
+            </a:extLst>
+          </p:cNvPr>
+          <p:cNvSpPr txBox="1"/>
+          <p:nvPr/>
+        </p:nvSpPr>
+        <p:spPr>
+          <a:xfrm>
+            <a:off x="6819608" y="839194"/>
+            <a:ext cx="508473" cy="400110"/>
+          </a:xfrm>
+          <a:prstGeom prst="rect">
+            <a:avLst/>
+          </a:prstGeom>
+          <a:noFill/>
+        </p:spPr>
+        <p:txBody>
+          <a:bodyPr wrap="none" rtlCol="0">
+            <a:spAutoFit/>
+          </a:bodyPr>
+          <a:lstStyle/>
+          <a:p>
+            <a:r>
+              <a:rPr lang="el-GR" sz="2000" dirty="0">
+                <a:solidFill>
+                  <a:schemeClr val="bg1"/>
+                </a:solidFill>
+                <a:latin typeface="Times New Roman" panose="02020603050405020304" pitchFamily="18" charset="0"/>
+                <a:cs typeface="Times New Roman" panose="02020603050405020304" pitchFamily="18" charset="0"/>
+              </a:rPr>
+              <a:t>λ</a:t>
+            </a:r>
+            <a:r>
+              <a:rPr lang="en-US" sz="2000" dirty="0">
+                <a:solidFill>
+                  <a:schemeClr val="bg1"/>
+                </a:solidFill>
+                <a:latin typeface="Times New Roman" panose="02020603050405020304" pitchFamily="18" charset="0"/>
+                <a:cs typeface="Times New Roman" panose="02020603050405020304" pitchFamily="18" charset="0"/>
+              </a:rPr>
+              <a:t>/2</a:t>
+            </a:r>
+          </a:p>
+        </p:txBody>
+      </p:sp>
+      <p:sp>
+        <p:nvSpPr>
+          <p:cNvPr id="22" name="TextBox 21">
+            <a:extLst>
+              <a:ext uri="{FF2B5EF4-FFF2-40B4-BE49-F238E27FC236}">
+                <a16:creationId xmlns:a16="http://schemas.microsoft.com/office/drawing/2014/main" id="{5FFB6796-1C15-40D2-A181-8B38AC7177A5}"/>
+              </a:ext>
+            </a:extLst>
+          </p:cNvPr>
+          <p:cNvSpPr txBox="1"/>
+          <p:nvPr/>
+        </p:nvSpPr>
+        <p:spPr>
+          <a:xfrm>
+            <a:off x="8386703" y="839194"/>
+            <a:ext cx="309700" cy="400110"/>
+          </a:xfrm>
+          <a:prstGeom prst="rect">
+            <a:avLst/>
+          </a:prstGeom>
+          <a:noFill/>
+        </p:spPr>
+        <p:txBody>
+          <a:bodyPr wrap="none" rtlCol="0">
+            <a:spAutoFit/>
+          </a:bodyPr>
+          <a:lstStyle/>
+          <a:p>
+            <a:r>
+              <a:rPr lang="el-GR" sz="2000" dirty="0">
+                <a:solidFill>
+                  <a:schemeClr val="bg1"/>
+                </a:solidFill>
+                <a:latin typeface="Times New Roman" panose="02020603050405020304" pitchFamily="18" charset="0"/>
+                <a:cs typeface="Times New Roman" panose="02020603050405020304" pitchFamily="18" charset="0"/>
+              </a:rPr>
+              <a:t>λ</a:t>
+            </a:r>
+            <a:endParaRPr lang="en-US" sz="2000" dirty="0">
+              <a:solidFill>
+                <a:schemeClr val="bg1"/>
+              </a:solidFill>
+              <a:latin typeface="Times New Roman" panose="02020603050405020304" pitchFamily="18" charset="0"/>
+              <a:cs typeface="Times New Roman" panose="02020603050405020304" pitchFamily="18" charset="0"/>
+            </a:endParaRPr>
+          </a:p>
+        </p:txBody>
+      </p:sp>
     </p:spTree>
     <p:extLst>
       <p:ext uri="{BB962C8B-B14F-4D97-AF65-F5344CB8AC3E}">
@@ -4606,10 +4625,10 @@
       </p:grpSpPr>
       <p:sp>
         <p:nvSpPr>
-          <p:cNvPr id="7" name="TextBox 6">
-            <a:extLst>
-              <a:ext uri="{FF2B5EF4-FFF2-40B4-BE49-F238E27FC236}">
-                <a16:creationId xmlns:a16="http://schemas.microsoft.com/office/drawing/2014/main" id="{3D7AB8D4-E017-4558-AB4D-DDCD39EC31F7}"/>
+          <p:cNvPr id="18" name="TextBox 17">
+            <a:extLst>
+              <a:ext uri="{FF2B5EF4-FFF2-40B4-BE49-F238E27FC236}">
+                <a16:creationId xmlns:a16="http://schemas.microsoft.com/office/drawing/2014/main" id="{819AD4DD-8A5A-42BC-AF09-1FD13F8517B2}"/>
               </a:ext>
             </a:extLst>
           </p:cNvPr>
@@ -4618,8 +4637,8 @@
         </p:nvSpPr>
         <p:spPr>
           <a:xfrm>
-            <a:off x="286137" y="1901364"/>
-            <a:ext cx="623889" cy="400110"/>
+            <a:off x="1099944" y="427318"/>
+            <a:ext cx="3752207" cy="400110"/>
           </a:xfrm>
           <a:prstGeom prst="rect">
             <a:avLst/>
@@ -4627,7 +4646,7 @@
           <a:noFill/>
         </p:spPr>
         <p:txBody>
-          <a:bodyPr wrap="none" rtlCol="0">
+          <a:bodyPr wrap="square" rtlCol="0">
             <a:spAutoFit/>
           </a:bodyPr>
           <a:lstStyle/>
@@ -4640,181 +4659,17 @@
                 <a:latin typeface="Times New Roman" panose="02020603050405020304" pitchFamily="18" charset="0"/>
                 <a:cs typeface="Times New Roman" panose="02020603050405020304" pitchFamily="18" charset="0"/>
               </a:rPr>
-              <a:t>0 µs</a:t>
-            </a:r>
-          </a:p>
-        </p:txBody>
-      </p:sp>
-      <p:sp>
-        <p:nvSpPr>
-          <p:cNvPr id="8" name="TextBox 7">
-            <a:extLst>
-              <a:ext uri="{FF2B5EF4-FFF2-40B4-BE49-F238E27FC236}">
-                <a16:creationId xmlns:a16="http://schemas.microsoft.com/office/drawing/2014/main" id="{17482850-7804-4AB1-BE57-61E458DFCE05}"/>
-              </a:ext>
-            </a:extLst>
-          </p:cNvPr>
-          <p:cNvSpPr txBox="1"/>
-          <p:nvPr/>
-        </p:nvSpPr>
-        <p:spPr>
-          <a:xfrm>
-            <a:off x="286137" y="2805998"/>
-            <a:ext cx="816249" cy="400110"/>
-          </a:xfrm>
-          <a:prstGeom prst="rect">
-            <a:avLst/>
-          </a:prstGeom>
-          <a:noFill/>
-        </p:spPr>
-        <p:txBody>
-          <a:bodyPr wrap="none" rtlCol="0">
-            <a:spAutoFit/>
-          </a:bodyPr>
-          <a:lstStyle/>
-          <a:p>
-            <a:r>
-              <a:rPr lang="en-US" sz="2000" dirty="0">
-                <a:solidFill>
-                  <a:schemeClr val="bg1"/>
-                </a:solidFill>
-                <a:latin typeface="Times New Roman" panose="02020603050405020304" pitchFamily="18" charset="0"/>
-                <a:cs typeface="Times New Roman" panose="02020603050405020304" pitchFamily="18" charset="0"/>
-              </a:rPr>
-              <a:t>.01 µs</a:t>
-            </a:r>
-          </a:p>
-        </p:txBody>
-      </p:sp>
-      <p:sp>
-        <p:nvSpPr>
-          <p:cNvPr id="9" name="TextBox 8">
-            <a:extLst>
-              <a:ext uri="{FF2B5EF4-FFF2-40B4-BE49-F238E27FC236}">
-                <a16:creationId xmlns:a16="http://schemas.microsoft.com/office/drawing/2014/main" id="{5E8AD933-0AAC-47A3-872A-4B4214749DAE}"/>
-              </a:ext>
-            </a:extLst>
-          </p:cNvPr>
-          <p:cNvSpPr txBox="1"/>
-          <p:nvPr/>
-        </p:nvSpPr>
-        <p:spPr>
-          <a:xfrm>
-            <a:off x="286137" y="3710632"/>
-            <a:ext cx="688009" cy="400110"/>
-          </a:xfrm>
-          <a:prstGeom prst="rect">
-            <a:avLst/>
-          </a:prstGeom>
-          <a:noFill/>
-        </p:spPr>
-        <p:txBody>
-          <a:bodyPr wrap="none" rtlCol="0">
-            <a:spAutoFit/>
-          </a:bodyPr>
-          <a:lstStyle/>
-          <a:p>
-            <a:r>
-              <a:rPr lang="en-US" sz="2000" dirty="0">
-                <a:solidFill>
-                  <a:schemeClr val="bg1"/>
-                </a:solidFill>
-                <a:latin typeface="Times New Roman" panose="02020603050405020304" pitchFamily="18" charset="0"/>
-                <a:cs typeface="Times New Roman" panose="02020603050405020304" pitchFamily="18" charset="0"/>
-              </a:rPr>
-              <a:t>.1 µs</a:t>
-            </a:r>
-          </a:p>
-        </p:txBody>
-      </p:sp>
-      <p:sp>
-        <p:nvSpPr>
-          <p:cNvPr id="10" name="TextBox 9">
-            <a:extLst>
-              <a:ext uri="{FF2B5EF4-FFF2-40B4-BE49-F238E27FC236}">
-                <a16:creationId xmlns:a16="http://schemas.microsoft.com/office/drawing/2014/main" id="{6DE07F4C-D37D-4434-A598-318869F51960}"/>
-              </a:ext>
-            </a:extLst>
-          </p:cNvPr>
-          <p:cNvSpPr txBox="1"/>
-          <p:nvPr/>
-        </p:nvSpPr>
-        <p:spPr>
-          <a:xfrm>
-            <a:off x="286137" y="4615267"/>
-            <a:ext cx="559769" cy="400110"/>
-          </a:xfrm>
-          <a:prstGeom prst="rect">
-            <a:avLst/>
-          </a:prstGeom>
-          <a:noFill/>
-        </p:spPr>
-        <p:txBody>
-          <a:bodyPr wrap="none" rtlCol="0">
-            <a:spAutoFit/>
-          </a:bodyPr>
-          <a:lstStyle/>
-          <a:p>
-            <a:r>
-              <a:rPr lang="en-US" sz="2000" dirty="0">
-                <a:solidFill>
-                  <a:schemeClr val="bg1"/>
-                </a:solidFill>
-                <a:latin typeface="Times New Roman" panose="02020603050405020304" pitchFamily="18" charset="0"/>
-                <a:cs typeface="Times New Roman" panose="02020603050405020304" pitchFamily="18" charset="0"/>
-              </a:rPr>
-              <a:t>1µs</a:t>
-            </a:r>
-          </a:p>
-        </p:txBody>
-      </p:sp>
-      <p:sp>
-        <p:nvSpPr>
-          <p:cNvPr id="18" name="TextBox 17">
-            <a:extLst>
-              <a:ext uri="{FF2B5EF4-FFF2-40B4-BE49-F238E27FC236}">
-                <a16:creationId xmlns:a16="http://schemas.microsoft.com/office/drawing/2014/main" id="{819AD4DD-8A5A-42BC-AF09-1FD13F8517B2}"/>
-              </a:ext>
-            </a:extLst>
-          </p:cNvPr>
-          <p:cNvSpPr txBox="1"/>
-          <p:nvPr/>
-        </p:nvSpPr>
-        <p:spPr>
-          <a:xfrm>
-            <a:off x="1593432" y="1307976"/>
-            <a:ext cx="3752207" cy="400110"/>
-          </a:xfrm>
-          <a:prstGeom prst="rect">
-            <a:avLst/>
-          </a:prstGeom>
-          <a:noFill/>
-        </p:spPr>
-        <p:txBody>
-          <a:bodyPr wrap="square" rtlCol="0">
-            <a:spAutoFit/>
-          </a:bodyPr>
-          <a:lstStyle/>
-          <a:p>
-            <a:r>
-              <a:rPr lang="en-US" sz="2000" dirty="0">
-                <a:solidFill>
-                  <a:schemeClr val="bg1"/>
-                </a:solidFill>
-                <a:latin typeface="Times New Roman" panose="02020603050405020304" pitchFamily="18" charset="0"/>
-                <a:cs typeface="Times New Roman" panose="02020603050405020304" pitchFamily="18" charset="0"/>
-              </a:rPr>
-              <a:t>Effect on PSF at transmit focus</a:t>
+              <a:t>PSFs at 5 Quantization values</a:t>
             </a:r>
           </a:p>
         </p:txBody>
       </p:sp>
       <p:pic>
         <p:nvPicPr>
-          <p:cNvPr id="3" name="Picture 2">
-            <a:extLst>
-              <a:ext uri="{FF2B5EF4-FFF2-40B4-BE49-F238E27FC236}">
-                <a16:creationId xmlns:a16="http://schemas.microsoft.com/office/drawing/2014/main" id="{0A2ECA91-F795-40A9-8740-EC1EFD63F2E6}"/>
+          <p:cNvPr id="2" name="Picture 1">
+            <a:extLst>
+              <a:ext uri="{FF2B5EF4-FFF2-40B4-BE49-F238E27FC236}">
+                <a16:creationId xmlns:a16="http://schemas.microsoft.com/office/drawing/2014/main" id="{A2BD345A-DFF1-475D-B9CA-C2C7BAE1685A}"/>
               </a:ext>
             </a:extLst>
           </p:cNvPr>
@@ -4831,20 +4686,327 @@
         </p:blipFill>
         <p:spPr>
           <a:xfrm>
-            <a:off x="1102386" y="1708086"/>
-            <a:ext cx="4473946" cy="3519237"/>
+            <a:off x="1580919" y="804361"/>
+            <a:ext cx="2616830" cy="5152516"/>
           </a:xfrm>
           <a:prstGeom prst="rect">
             <a:avLst/>
           </a:prstGeom>
         </p:spPr>
       </p:pic>
+      <p:sp>
+        <p:nvSpPr>
+          <p:cNvPr id="8" name="TextBox 7">
+            <a:extLst>
+              <a:ext uri="{FF2B5EF4-FFF2-40B4-BE49-F238E27FC236}">
+                <a16:creationId xmlns:a16="http://schemas.microsoft.com/office/drawing/2014/main" id="{17482850-7804-4AB1-BE57-61E458DFCE05}"/>
+              </a:ext>
+            </a:extLst>
+          </p:cNvPr>
+          <p:cNvSpPr txBox="1"/>
+          <p:nvPr/>
+        </p:nvSpPr>
+        <p:spPr>
+          <a:xfrm>
+            <a:off x="1349452" y="1122340"/>
+            <a:ext cx="904034" cy="707886"/>
+          </a:xfrm>
+          <a:prstGeom prst="rect">
+            <a:avLst/>
+          </a:prstGeom>
+          <a:noFill/>
+        </p:spPr>
+        <p:txBody>
+          <a:bodyPr wrap="square" rtlCol="0">
+            <a:spAutoFit/>
+          </a:bodyPr>
+          <a:lstStyle/>
+          <a:p>
+            <a:r>
+              <a:rPr lang="el-GR" sz="2000" dirty="0">
+                <a:solidFill>
+                  <a:schemeClr val="bg1"/>
+                </a:solidFill>
+                <a:latin typeface="Times New Roman" panose="02020603050405020304" pitchFamily="18" charset="0"/>
+                <a:cs typeface="Times New Roman" panose="02020603050405020304" pitchFamily="18" charset="0"/>
+              </a:rPr>
+              <a:t>λ</a:t>
+            </a:r>
+            <a:r>
+              <a:rPr lang="en-US" sz="2000" dirty="0">
+                <a:solidFill>
+                  <a:schemeClr val="bg1"/>
+                </a:solidFill>
+                <a:latin typeface="Times New Roman" panose="02020603050405020304" pitchFamily="18" charset="0"/>
+                <a:cs typeface="Times New Roman" panose="02020603050405020304" pitchFamily="18" charset="0"/>
+              </a:rPr>
+              <a:t>/20</a:t>
+            </a:r>
+          </a:p>
+          <a:p>
+            <a:endParaRPr lang="en-US" sz="2000" dirty="0">
+              <a:solidFill>
+                <a:schemeClr val="bg1"/>
+              </a:solidFill>
+              <a:latin typeface="Times New Roman" panose="02020603050405020304" pitchFamily="18" charset="0"/>
+              <a:cs typeface="Times New Roman" panose="02020603050405020304" pitchFamily="18" charset="0"/>
+            </a:endParaRPr>
+          </a:p>
+        </p:txBody>
+      </p:sp>
+      <p:sp>
+        <p:nvSpPr>
+          <p:cNvPr id="11" name="TextBox 10">
+            <a:extLst>
+              <a:ext uri="{FF2B5EF4-FFF2-40B4-BE49-F238E27FC236}">
+                <a16:creationId xmlns:a16="http://schemas.microsoft.com/office/drawing/2014/main" id="{FF5A4473-13F8-4CE1-8408-8E6F4271E100}"/>
+              </a:ext>
+            </a:extLst>
+          </p:cNvPr>
+          <p:cNvSpPr txBox="1"/>
+          <p:nvPr/>
+        </p:nvSpPr>
+        <p:spPr>
+          <a:xfrm>
+            <a:off x="1349452" y="2102485"/>
+            <a:ext cx="904034" cy="707886"/>
+          </a:xfrm>
+          <a:prstGeom prst="rect">
+            <a:avLst/>
+          </a:prstGeom>
+          <a:noFill/>
+        </p:spPr>
+        <p:txBody>
+          <a:bodyPr wrap="square" rtlCol="0">
+            <a:spAutoFit/>
+          </a:bodyPr>
+          <a:lstStyle/>
+          <a:p>
+            <a:r>
+              <a:rPr lang="el-GR" sz="2000" dirty="0">
+                <a:solidFill>
+                  <a:schemeClr val="bg1"/>
+                </a:solidFill>
+                <a:latin typeface="Times New Roman" panose="02020603050405020304" pitchFamily="18" charset="0"/>
+                <a:cs typeface="Times New Roman" panose="02020603050405020304" pitchFamily="18" charset="0"/>
+              </a:rPr>
+              <a:t>λ</a:t>
+            </a:r>
+            <a:r>
+              <a:rPr lang="en-US" sz="2000" dirty="0">
+                <a:solidFill>
+                  <a:schemeClr val="bg1"/>
+                </a:solidFill>
+                <a:latin typeface="Times New Roman" panose="02020603050405020304" pitchFamily="18" charset="0"/>
+                <a:cs typeface="Times New Roman" panose="02020603050405020304" pitchFamily="18" charset="0"/>
+              </a:rPr>
+              <a:t>/10</a:t>
+            </a:r>
+          </a:p>
+          <a:p>
+            <a:endParaRPr lang="en-US" sz="2000" dirty="0">
+              <a:solidFill>
+                <a:schemeClr val="bg1"/>
+              </a:solidFill>
+              <a:latin typeface="Times New Roman" panose="02020603050405020304" pitchFamily="18" charset="0"/>
+              <a:cs typeface="Times New Roman" panose="02020603050405020304" pitchFamily="18" charset="0"/>
+            </a:endParaRPr>
+          </a:p>
+        </p:txBody>
+      </p:sp>
+      <p:sp>
+        <p:nvSpPr>
+          <p:cNvPr id="12" name="TextBox 11">
+            <a:extLst>
+              <a:ext uri="{FF2B5EF4-FFF2-40B4-BE49-F238E27FC236}">
+                <a16:creationId xmlns:a16="http://schemas.microsoft.com/office/drawing/2014/main" id="{D0F25DCE-0EB6-46F9-A955-5A2E39634C76}"/>
+              </a:ext>
+            </a:extLst>
+          </p:cNvPr>
+          <p:cNvSpPr txBox="1"/>
+          <p:nvPr/>
+        </p:nvSpPr>
+        <p:spPr>
+          <a:xfrm>
+            <a:off x="1349452" y="3082630"/>
+            <a:ext cx="904034" cy="707886"/>
+          </a:xfrm>
+          <a:prstGeom prst="rect">
+            <a:avLst/>
+          </a:prstGeom>
+          <a:noFill/>
+        </p:spPr>
+        <p:txBody>
+          <a:bodyPr wrap="square" rtlCol="0">
+            <a:spAutoFit/>
+          </a:bodyPr>
+          <a:lstStyle/>
+          <a:p>
+            <a:r>
+              <a:rPr lang="el-GR" sz="2000" dirty="0">
+                <a:solidFill>
+                  <a:schemeClr val="bg1"/>
+                </a:solidFill>
+                <a:latin typeface="Times New Roman" panose="02020603050405020304" pitchFamily="18" charset="0"/>
+                <a:cs typeface="Times New Roman" panose="02020603050405020304" pitchFamily="18" charset="0"/>
+              </a:rPr>
+              <a:t>λ</a:t>
+            </a:r>
+            <a:r>
+              <a:rPr lang="en-US" sz="2000" dirty="0">
+                <a:solidFill>
+                  <a:schemeClr val="bg1"/>
+                </a:solidFill>
+                <a:latin typeface="Times New Roman" panose="02020603050405020304" pitchFamily="18" charset="0"/>
+                <a:cs typeface="Times New Roman" panose="02020603050405020304" pitchFamily="18" charset="0"/>
+              </a:rPr>
+              <a:t>/5</a:t>
+            </a:r>
+          </a:p>
+          <a:p>
+            <a:endParaRPr lang="en-US" sz="2000" dirty="0">
+              <a:solidFill>
+                <a:schemeClr val="bg1"/>
+              </a:solidFill>
+              <a:latin typeface="Times New Roman" panose="02020603050405020304" pitchFamily="18" charset="0"/>
+              <a:cs typeface="Times New Roman" panose="02020603050405020304" pitchFamily="18" charset="0"/>
+            </a:endParaRPr>
+          </a:p>
+        </p:txBody>
+      </p:sp>
+      <p:sp>
+        <p:nvSpPr>
+          <p:cNvPr id="13" name="TextBox 12">
+            <a:extLst>
+              <a:ext uri="{FF2B5EF4-FFF2-40B4-BE49-F238E27FC236}">
+                <a16:creationId xmlns:a16="http://schemas.microsoft.com/office/drawing/2014/main" id="{2A75F3AF-BF8B-44DE-A2E0-63F92EC237E3}"/>
+              </a:ext>
+            </a:extLst>
+          </p:cNvPr>
+          <p:cNvSpPr txBox="1"/>
+          <p:nvPr/>
+        </p:nvSpPr>
+        <p:spPr>
+          <a:xfrm>
+            <a:off x="1349452" y="4062775"/>
+            <a:ext cx="904034" cy="707886"/>
+          </a:xfrm>
+          <a:prstGeom prst="rect">
+            <a:avLst/>
+          </a:prstGeom>
+          <a:noFill/>
+        </p:spPr>
+        <p:txBody>
+          <a:bodyPr wrap="square" rtlCol="0">
+            <a:spAutoFit/>
+          </a:bodyPr>
+          <a:lstStyle/>
+          <a:p>
+            <a:r>
+              <a:rPr lang="el-GR" sz="2000" dirty="0">
+                <a:solidFill>
+                  <a:schemeClr val="bg1"/>
+                </a:solidFill>
+                <a:latin typeface="Times New Roman" panose="02020603050405020304" pitchFamily="18" charset="0"/>
+                <a:cs typeface="Times New Roman" panose="02020603050405020304" pitchFamily="18" charset="0"/>
+              </a:rPr>
+              <a:t>λ</a:t>
+            </a:r>
+            <a:r>
+              <a:rPr lang="en-US" sz="2000" dirty="0">
+                <a:solidFill>
+                  <a:schemeClr val="bg1"/>
+                </a:solidFill>
+                <a:latin typeface="Times New Roman" panose="02020603050405020304" pitchFamily="18" charset="0"/>
+                <a:cs typeface="Times New Roman" panose="02020603050405020304" pitchFamily="18" charset="0"/>
+              </a:rPr>
+              <a:t>/1</a:t>
+            </a:r>
+          </a:p>
+          <a:p>
+            <a:endParaRPr lang="en-US" sz="2000" dirty="0">
+              <a:solidFill>
+                <a:schemeClr val="bg1"/>
+              </a:solidFill>
+              <a:latin typeface="Times New Roman" panose="02020603050405020304" pitchFamily="18" charset="0"/>
+              <a:cs typeface="Times New Roman" panose="02020603050405020304" pitchFamily="18" charset="0"/>
+            </a:endParaRPr>
+          </a:p>
+        </p:txBody>
+      </p:sp>
+      <p:sp>
+        <p:nvSpPr>
+          <p:cNvPr id="14" name="TextBox 13">
+            <a:extLst>
+              <a:ext uri="{FF2B5EF4-FFF2-40B4-BE49-F238E27FC236}">
+                <a16:creationId xmlns:a16="http://schemas.microsoft.com/office/drawing/2014/main" id="{DE6FA7D8-79A8-4DCB-AFF8-97B25BAF797B}"/>
+              </a:ext>
+            </a:extLst>
+          </p:cNvPr>
+          <p:cNvSpPr txBox="1"/>
+          <p:nvPr/>
+        </p:nvSpPr>
+        <p:spPr>
+          <a:xfrm>
+            <a:off x="1349452" y="5042918"/>
+            <a:ext cx="904034" cy="707886"/>
+          </a:xfrm>
+          <a:prstGeom prst="rect">
+            <a:avLst/>
+          </a:prstGeom>
+          <a:noFill/>
+        </p:spPr>
+        <p:txBody>
+          <a:bodyPr wrap="square" rtlCol="0">
+            <a:spAutoFit/>
+          </a:bodyPr>
+          <a:lstStyle/>
+          <a:p>
+            <a:r>
+              <a:rPr lang="en-US" sz="2000" dirty="0">
+                <a:solidFill>
+                  <a:schemeClr val="bg1"/>
+                </a:solidFill>
+                <a:latin typeface="Times New Roman" panose="02020603050405020304" pitchFamily="18" charset="0"/>
+                <a:cs typeface="Times New Roman" panose="02020603050405020304" pitchFamily="18" charset="0"/>
+              </a:rPr>
+              <a:t>2 </a:t>
+            </a:r>
+            <a:r>
+              <a:rPr lang="el-GR" sz="2000" dirty="0">
+                <a:solidFill>
+                  <a:schemeClr val="bg1"/>
+                </a:solidFill>
+                <a:latin typeface="Times New Roman" panose="02020603050405020304" pitchFamily="18" charset="0"/>
+                <a:cs typeface="Times New Roman" panose="02020603050405020304" pitchFamily="18" charset="0"/>
+              </a:rPr>
+              <a:t>λ</a:t>
+            </a:r>
+            <a:endParaRPr lang="en-US" sz="2000" dirty="0">
+              <a:solidFill>
+                <a:schemeClr val="bg1"/>
+              </a:solidFill>
+              <a:latin typeface="Times New Roman" panose="02020603050405020304" pitchFamily="18" charset="0"/>
+              <a:cs typeface="Times New Roman" panose="02020603050405020304" pitchFamily="18" charset="0"/>
+            </a:endParaRPr>
+          </a:p>
+          <a:p>
+            <a:endParaRPr lang="en-US" sz="2000" dirty="0">
+              <a:solidFill>
+                <a:schemeClr val="bg1"/>
+              </a:solidFill>
+              <a:latin typeface="Times New Roman" panose="02020603050405020304" pitchFamily="18" charset="0"/>
+              <a:cs typeface="Times New Roman" panose="02020603050405020304" pitchFamily="18" charset="0"/>
+            </a:endParaRPr>
+          </a:p>
+        </p:txBody>
+      </p:sp>
       <p:pic>
         <p:nvPicPr>
-          <p:cNvPr id="19" name="Picture 18" descr="A close up of a map&#10;&#10;Description automatically generated">
-            <a:extLst>
-              <a:ext uri="{FF2B5EF4-FFF2-40B4-BE49-F238E27FC236}">
-                <a16:creationId xmlns:a16="http://schemas.microsoft.com/office/drawing/2014/main" id="{9C3025B3-2BC1-4CBA-A0A0-0A2C5C4A84C7}"/>
+          <p:cNvPr id="4" name="Picture 3">
+            <a:extLst>
+              <a:ext uri="{FF2B5EF4-FFF2-40B4-BE49-F238E27FC236}">
+                <a16:creationId xmlns:a16="http://schemas.microsoft.com/office/drawing/2014/main" id="{23B79A2B-F30A-4AAF-96D6-357A2CA19DBF}"/>
               </a:ext>
             </a:extLst>
           </p:cNvPr>
@@ -4854,21 +5016,15 @@
           <p:nvPr/>
         </p:nvPicPr>
         <p:blipFill>
-          <a:blip r:embed="rId4">
-            <a:extLst>
-              <a:ext uri="{28A0092B-C50C-407E-A947-70E740481C1C}">
-                <a14:useLocalDpi xmlns:a14="http://schemas.microsoft.com/office/drawing/2010/main" val="0"/>
-              </a:ext>
-            </a:extLst>
-          </a:blip>
+          <a:blip r:embed="rId4"/>
           <a:stretch>
             <a:fillRect/>
           </a:stretch>
         </p:blipFill>
         <p:spPr>
           <a:xfrm>
-            <a:off x="6178226" y="1391786"/>
-            <a:ext cx="4911388" cy="4258277"/>
+            <a:off x="4641154" y="1251480"/>
+            <a:ext cx="5086849" cy="4258277"/>
           </a:xfrm>
           <a:prstGeom prst="rect">
             <a:avLst/>

</xml_diff>